<commit_message>
Updated the Contents of PPT
</commit_message>
<xml_diff>
--- a/Sentiment Analysis PPT.pptx
+++ b/Sentiment Analysis PPT.pptx
@@ -5,7 +5,7 @@
     <p:sldMasterId id="2147484248" r:id="rId1"/>
   </p:sldMasterIdLst>
   <p:notesMasterIdLst>
-    <p:notesMasterId r:id="rId28"/>
+    <p:notesMasterId r:id="rId29"/>
   </p:notesMasterIdLst>
   <p:sldIdLst>
     <p:sldId id="256" r:id="rId2"/>
@@ -28,22 +28,23 @@
     <p:sldId id="363" r:id="rId19"/>
     <p:sldId id="360" r:id="rId20"/>
     <p:sldId id="361" r:id="rId21"/>
-    <p:sldId id="362" r:id="rId22"/>
-    <p:sldId id="352" r:id="rId23"/>
-    <p:sldId id="353" r:id="rId24"/>
-    <p:sldId id="364" r:id="rId25"/>
-    <p:sldId id="296" r:id="rId26"/>
-    <p:sldId id="294" r:id="rId27"/>
+    <p:sldId id="365" r:id="rId22"/>
+    <p:sldId id="362" r:id="rId23"/>
+    <p:sldId id="352" r:id="rId24"/>
+    <p:sldId id="353" r:id="rId25"/>
+    <p:sldId id="364" r:id="rId26"/>
+    <p:sldId id="296" r:id="rId27"/>
+    <p:sldId id="294" r:id="rId28"/>
   </p:sldIdLst>
   <p:sldSz cx="9144000" cy="6858000" type="screen4x3"/>
   <p:notesSz cx="6858000" cy="9144000"/>
   <p:embeddedFontLst>
     <p:embeddedFont>
       <p:font typeface="Gill Sans MT" panose="020B0502020104020203" pitchFamily="34" charset="0"/>
-      <p:regular r:id="rId29"/>
-      <p:bold r:id="rId30"/>
-      <p:italic r:id="rId31"/>
-      <p:boldItalic r:id="rId32"/>
+      <p:regular r:id="rId30"/>
+      <p:bold r:id="rId31"/>
+      <p:italic r:id="rId32"/>
+      <p:boldItalic r:id="rId33"/>
     </p:embeddedFont>
   </p:embeddedFontLst>
   <p:defaultTextStyle>
@@ -166,6 +167,7 @@
             <p14:sldId id="363"/>
             <p14:sldId id="360"/>
             <p14:sldId id="361"/>
+            <p14:sldId id="365"/>
             <p14:sldId id="362"/>
             <p14:sldId id="352"/>
             <p14:sldId id="353"/>
@@ -191,10 +193,126 @@
       </p15:sldGuideLst>
     </p:ext>
     <p:ext uri="http://customooxmlschemas.google.com/">
-      <go:slidesCustomData xmlns:go="http://customooxmlschemas.google.com/" xmlns:ahyp="http://schemas.microsoft.com/office/drawing/2018/hyperlinkcolor" xmlns:p15="http://schemas.microsoft.com/office/powerpoint/2012/main" xmlns:p14="http://schemas.microsoft.com/office/powerpoint/2010/main" xmlns:com="http://schemas.openxmlformats.org/drawingml/2006/compatibility" xmlns:pvml="urn:schemas-microsoft-com:office:powerpoint" xmlns:v="urn:schemas-microsoft-com:vml" xmlns:o="urn:schemas-microsoft-com:office:office" xmlns:dgm="http://schemas.openxmlformats.org/drawingml/2006/diagram" xmlns:c="http://schemas.openxmlformats.org/drawingml/2006/chart" xmlns:mv="urn:schemas-microsoft-com:mac:vml" xmlns:mc="http://schemas.openxmlformats.org/markup-compatibility/2006" xmlns="" r:id="rId46" roundtripDataSignature="AMtx7mh0xsihnaAQnR/7PSBjVcidkV3VYA=="/>
+      <go:slidesCustomData xmlns="" xmlns:mc="http://schemas.openxmlformats.org/markup-compatibility/2006" xmlns:mv="urn:schemas-microsoft-com:mac:vml" xmlns:c="http://schemas.openxmlformats.org/drawingml/2006/chart" xmlns:dgm="http://schemas.openxmlformats.org/drawingml/2006/diagram" xmlns:o="urn:schemas-microsoft-com:office:office" xmlns:v="urn:schemas-microsoft-com:vml" xmlns:pvml="urn:schemas-microsoft-com:office:powerpoint" xmlns:com="http://schemas.openxmlformats.org/drawingml/2006/compatibility" xmlns:p14="http://schemas.microsoft.com/office/powerpoint/2010/main" xmlns:p15="http://schemas.microsoft.com/office/powerpoint/2012/main" xmlns:ahyp="http://schemas.microsoft.com/office/drawing/2018/hyperlinkcolor" xmlns:go="http://customooxmlschemas.google.com/" r:id="rId46" roundtripDataSignature="AMtx7mh0xsihnaAQnR/7PSBjVcidkV3VYA=="/>
     </p:ext>
   </p:extLst>
 </p:presentation>
+</file>
+
+<file path=ppt/revisionInfo.xml><?xml version="1.0" encoding="utf-8"?>
+<p1510:revInfo xmlns:a="http://schemas.openxmlformats.org/drawingml/2006/main" xmlns:r="http://schemas.openxmlformats.org/officeDocument/2006/relationships" xmlns:p1510="http://schemas.microsoft.com/office/powerpoint/2015/10/main">
+  <p1510:revLst>
+    <p1510:client id="{1C209274-9E41-4F10-ABE9-232A6D51190D}" v="101" dt="2024-05-14T08:55:21.483"/>
+  </p1510:revLst>
+</p1510:revInfo>
+</file>
+
+<file path=ppt/changesInfos/changesInfo1.xml><?xml version="1.0" encoding="utf-8"?>
+<pc:chgInfo xmlns:a="http://schemas.openxmlformats.org/drawingml/2006/main" xmlns:r="http://schemas.openxmlformats.org/officeDocument/2006/relationships" xmlns:ac="http://schemas.microsoft.com/office/drawing/2013/main/command" xmlns:pc="http://schemas.microsoft.com/office/powerpoint/2013/main/command">
+  <pc:docChgLst>
+    <pc:chgData name="Pearl 👾" userId="19056154ae6c83f7" providerId="LiveId" clId="{1C209274-9E41-4F10-ABE9-232A6D51190D}"/>
+    <pc:docChg chg="custSel addSld modSld modSection">
+      <pc:chgData name="Pearl 👾" userId="19056154ae6c83f7" providerId="LiveId" clId="{1C209274-9E41-4F10-ABE9-232A6D51190D}" dt="2024-05-14T08:53:49.834" v="181"/>
+      <pc:docMkLst>
+        <pc:docMk/>
+      </pc:docMkLst>
+      <pc:sldChg chg="setBg">
+        <pc:chgData name="Pearl 👾" userId="19056154ae6c83f7" providerId="LiveId" clId="{1C209274-9E41-4F10-ABE9-232A6D51190D}" dt="2024-05-14T08:53:49.834" v="181"/>
+        <pc:sldMkLst>
+          <pc:docMk/>
+          <pc:sldMk cId="0" sldId="256"/>
+        </pc:sldMkLst>
+      </pc:sldChg>
+      <pc:sldChg chg="addSp delSp modSp add mod modClrScheme chgLayout">
+        <pc:chgData name="Pearl 👾" userId="19056154ae6c83f7" providerId="LiveId" clId="{1C209274-9E41-4F10-ABE9-232A6D51190D}" dt="2024-05-14T08:52:17.340" v="94" actId="20577"/>
+        <pc:sldMkLst>
+          <pc:docMk/>
+          <pc:sldMk cId="2377316459" sldId="365"/>
+        </pc:sldMkLst>
+        <pc:spChg chg="mod ord">
+          <ac:chgData name="Pearl 👾" userId="19056154ae6c83f7" providerId="LiveId" clId="{1C209274-9E41-4F10-ABE9-232A6D51190D}" dt="2024-05-14T08:52:17.340" v="94" actId="20577"/>
+          <ac:spMkLst>
+            <pc:docMk/>
+            <pc:sldMk cId="2377316459" sldId="365"/>
+            <ac:spMk id="2" creationId="{00000000-0000-0000-0000-000000000000}"/>
+          </ac:spMkLst>
+        </pc:spChg>
+        <pc:spChg chg="del">
+          <ac:chgData name="Pearl 👾" userId="19056154ae6c83f7" providerId="LiveId" clId="{1C209274-9E41-4F10-ABE9-232A6D51190D}" dt="2024-05-14T08:50:44.310" v="16" actId="478"/>
+          <ac:spMkLst>
+            <pc:docMk/>
+            <pc:sldMk cId="2377316459" sldId="365"/>
+            <ac:spMk id="3" creationId="{02218194-AC1D-A58D-6DCF-BF0826ACF195}"/>
+          </ac:spMkLst>
+        </pc:spChg>
+        <pc:spChg chg="add del mod ord">
+          <ac:chgData name="Pearl 👾" userId="19056154ae6c83f7" providerId="LiveId" clId="{1C209274-9E41-4F10-ABE9-232A6D51190D}" dt="2024-05-14T08:48:53.783" v="3" actId="700"/>
+          <ac:spMkLst>
+            <pc:docMk/>
+            <pc:sldMk cId="2377316459" sldId="365"/>
+            <ac:spMk id="4" creationId="{234BCA5F-E0F1-D218-B49D-731B26DF8637}"/>
+          </ac:spMkLst>
+        </pc:spChg>
+        <pc:spChg chg="mod ord">
+          <ac:chgData name="Pearl 👾" userId="19056154ae6c83f7" providerId="LiveId" clId="{1C209274-9E41-4F10-ABE9-232A6D51190D}" dt="2024-05-14T08:48:53.783" v="3" actId="700"/>
+          <ac:spMkLst>
+            <pc:docMk/>
+            <pc:sldMk cId="2377316459" sldId="365"/>
+            <ac:spMk id="5" creationId="{00000000-0000-0000-0000-000000000000}"/>
+          </ac:spMkLst>
+        </pc:spChg>
+        <pc:spChg chg="add del mod ord">
+          <ac:chgData name="Pearl 👾" userId="19056154ae6c83f7" providerId="LiveId" clId="{1C209274-9E41-4F10-ABE9-232A6D51190D}" dt="2024-05-14T08:49:25.867" v="5" actId="931"/>
+          <ac:spMkLst>
+            <pc:docMk/>
+            <pc:sldMk cId="2377316459" sldId="365"/>
+            <ac:spMk id="6" creationId="{680CE74D-3A2B-48D0-1349-966A6AE38249}"/>
+          </ac:spMkLst>
+        </pc:spChg>
+        <pc:spChg chg="del">
+          <ac:chgData name="Pearl 👾" userId="19056154ae6c83f7" providerId="LiveId" clId="{1C209274-9E41-4F10-ABE9-232A6D51190D}" dt="2024-05-14T08:50:47.281" v="17" actId="478"/>
+          <ac:spMkLst>
+            <pc:docMk/>
+            <pc:sldMk cId="2377316459" sldId="365"/>
+            <ac:spMk id="7" creationId="{861EE6D2-2D48-7E36-EFA8-45638E311590}"/>
+          </ac:spMkLst>
+        </pc:spChg>
+        <pc:spChg chg="add del mod ord">
+          <ac:chgData name="Pearl 👾" userId="19056154ae6c83f7" providerId="LiveId" clId="{1C209274-9E41-4F10-ABE9-232A6D51190D}" dt="2024-05-14T08:50:38.892" v="15" actId="478"/>
+          <ac:spMkLst>
+            <pc:docMk/>
+            <pc:sldMk cId="2377316459" sldId="365"/>
+            <ac:spMk id="8" creationId="{E4C5C92C-0B3D-CC35-868D-3FC52448677A}"/>
+          </ac:spMkLst>
+        </pc:spChg>
+        <pc:picChg chg="del">
+          <ac:chgData name="Pearl 👾" userId="19056154ae6c83f7" providerId="LiveId" clId="{1C209274-9E41-4F10-ABE9-232A6D51190D}" dt="2024-05-14T08:48:43.197" v="2" actId="478"/>
+          <ac:picMkLst>
+            <pc:docMk/>
+            <pc:sldMk cId="2377316459" sldId="365"/>
+            <ac:picMk id="10" creationId="{9137B43A-C3CB-C414-152E-AA7EF34CAA67}"/>
+          </ac:picMkLst>
+        </pc:picChg>
+        <pc:picChg chg="del">
+          <ac:chgData name="Pearl 👾" userId="19056154ae6c83f7" providerId="LiveId" clId="{1C209274-9E41-4F10-ABE9-232A6D51190D}" dt="2024-05-14T08:48:39.706" v="1" actId="478"/>
+          <ac:picMkLst>
+            <pc:docMk/>
+            <pc:sldMk cId="2377316459" sldId="365"/>
+            <ac:picMk id="11" creationId="{6FFEA23B-C10B-D95C-68E9-16CC4AFCD251}"/>
+          </ac:picMkLst>
+        </pc:picChg>
+        <pc:picChg chg="add mod modCrop">
+          <ac:chgData name="Pearl 👾" userId="19056154ae6c83f7" providerId="LiveId" clId="{1C209274-9E41-4F10-ABE9-232A6D51190D}" dt="2024-05-14T08:52:01.229" v="92" actId="14100"/>
+          <ac:picMkLst>
+            <pc:docMk/>
+            <pc:sldMk cId="2377316459" sldId="365"/>
+            <ac:picMk id="12" creationId="{78CB354C-3E8A-3EDA-0400-60EF3E428AD6}"/>
+          </ac:picMkLst>
+        </pc:picChg>
+      </pc:sldChg>
+    </pc:docChg>
+  </pc:docChgLst>
+</pc:chgInfo>
 </file>
 
 <file path=ppt/notesMasters/notesMaster1.xml><?xml version="1.0" encoding="utf-8"?>
@@ -2214,10 +2332,9 @@
           </a:lstStyle>
           <a:p>
             <a:r>
-              <a:rPr lang="en-US"/>
+              <a:rPr lang="en-US" dirty="0"/>
               <a:t>Click icon to add picture</a:t>
             </a:r>
-            <a:endParaRPr lang="en-US" dirty="0"/>
           </a:p>
         </p:txBody>
       </p:sp>
@@ -4164,10 +4281,9 @@
           </a:lstStyle>
           <a:p>
             <a:r>
-              <a:rPr lang="en-US"/>
+              <a:rPr lang="en-US" dirty="0"/>
               <a:t>Click icon to add picture</a:t>
             </a:r>
-            <a:endParaRPr lang="en-US" dirty="0"/>
           </a:p>
         </p:txBody>
       </p:sp>
@@ -4993,6 +5109,12 @@
                       <a14:sharpenSoften amount="9000"/>
                     </a14:imgEffect>
                     <a14:imgEffect>
+                      <a14:colorTemperature colorTemp="7220"/>
+                    </a14:imgEffect>
+                    <a14:imgEffect>
+                      <a14:saturation sat="134000"/>
+                    </a14:imgEffect>
+                    <a14:imgEffect>
                       <a14:brightnessContrast bright="14000" contrast="13000"/>
                     </a14:imgEffect>
                   </a14:imgLayer>
@@ -5521,7 +5643,7 @@
               <a:buNone/>
             </a:pPr>
             <a:r>
-              <a:rPr lang="en-US" sz="2000" b="1" dirty="0" err="1">
+              <a:rPr lang="en-US" sz="2000" b="1" dirty="0">
                 <a:latin typeface="Gill Sans MT" panose="020B0502020104020203" pitchFamily="34" charset="0"/>
               </a:rPr>
               <a:t>Plotly</a:t>
@@ -5538,40 +5660,10 @@
               <a:buNone/>
             </a:pPr>
             <a:r>
-              <a:rPr lang="en-US" sz="1600" dirty="0" err="1">
-                <a:latin typeface="Gill Sans MT" panose="020B0502020104020203" pitchFamily="34" charset="0"/>
-              </a:rPr>
-              <a:t>Plotly</a:t>
-            </a:r>
-            <a:r>
               <a:rPr lang="en-US" sz="1600" dirty="0">
                 <a:latin typeface="Gill Sans MT" panose="020B0502020104020203" pitchFamily="34" charset="0"/>
               </a:rPr>
-              <a:t> is a Python library used for creating interactive visualizations. In our project, </a:t>
-            </a:r>
-            <a:r>
-              <a:rPr lang="en-US" sz="1600" dirty="0" err="1">
-                <a:latin typeface="Gill Sans MT" panose="020B0502020104020203" pitchFamily="34" charset="0"/>
-              </a:rPr>
-              <a:t>Plotly</a:t>
-            </a:r>
-            <a:r>
-              <a:rPr lang="en-US" sz="1600" dirty="0">
-                <a:latin typeface="Gill Sans MT" panose="020B0502020104020203" pitchFamily="34" charset="0"/>
-              </a:rPr>
-              <a:t> is employed to visualize sentiment trends, word frequencies, and topic clusters extracted from social media data. By leveraging </a:t>
-            </a:r>
-            <a:r>
-              <a:rPr lang="en-US" sz="1600" dirty="0" err="1">
-                <a:latin typeface="Gill Sans MT" panose="020B0502020104020203" pitchFamily="34" charset="0"/>
-              </a:rPr>
-              <a:t>Plotly's</a:t>
-            </a:r>
-            <a:r>
-              <a:rPr lang="en-US" sz="1600" dirty="0">
-                <a:latin typeface="Gill Sans MT" panose="020B0502020104020203" pitchFamily="34" charset="0"/>
-              </a:rPr>
-              <a:t> rich array of visualization tools, we can effectively communicate insights to stakeholders, allowing for intuitive exploration of sentiment dynamics and facilitating data-driven decision-making.</a:t>
+              <a:t>Plotly is a Python library used for creating interactive visualizations. In our project, Plotly is employed to visualize sentiment trends, word frequencies, and topic clusters extracted from social media data. By leveraging Plotly's rich array of visualization tools, we can effectively communicate insights to stakeholders, allowing for intuitive exploration of sentiment dynamics and facilitating data-driven decision-making.</a:t>
             </a:r>
           </a:p>
         </p:txBody>
@@ -5723,19 +5815,7 @@
               <a:rPr lang="en-US" sz="1600" dirty="0">
                 <a:latin typeface="Gill Sans MT" panose="020B0502020104020203" pitchFamily="34" charset="0"/>
               </a:rPr>
-              <a:t>NLTK (Natural Language Toolkit) is a Python library widely used for natural language processing tasks. In our project, NLTK plays a crucial role in text preprocessing, tokenization, and sentiment analysis. We utilize its functions for tasks such as removing </a:t>
-            </a:r>
-            <a:r>
-              <a:rPr lang="en-US" sz="1600" dirty="0" err="1">
-                <a:latin typeface="Gill Sans MT" panose="020B0502020104020203" pitchFamily="34" charset="0"/>
-              </a:rPr>
-              <a:t>stopwords</a:t>
-            </a:r>
-            <a:r>
-              <a:rPr lang="en-US" sz="1600" dirty="0">
-                <a:latin typeface="Gill Sans MT" panose="020B0502020104020203" pitchFamily="34" charset="0"/>
-              </a:rPr>
-              <a:t>, stemming, and lemmatization to clean and prepare text data for analysis. Additionally, NLTK's sentiment analysis module provides tools for classifying the sentiment of social media posts, enhancing our understanding of user opinions and emotions. </a:t>
+              <a:t>NLTK (Natural Language Toolkit) is a Python library widely used for natural language processing tasks. In our project, NLTK plays a crucial role in text preprocessing, tokenization, and sentiment analysis. We utilize its functions for tasks such as removing stopwords, stemming, and lemmatization to clean and prepare text data for analysis. Additionally, NLTK's sentiment analysis module provides tools for classifying the sentiment of social media posts, enhancing our understanding of user opinions and emotions. </a:t>
             </a:r>
           </a:p>
         </p:txBody>
@@ -5868,16 +5948,10 @@
               <a:buNone/>
             </a:pPr>
             <a:r>
-              <a:rPr lang="en-US" sz="2000" b="1" dirty="0" err="1">
-                <a:latin typeface="Gill Sans MT" panose="020B0502020104020203" pitchFamily="34" charset="0"/>
-              </a:rPr>
-              <a:t>Tweepy</a:t>
-            </a:r>
-            <a:r>
               <a:rPr lang="en-US" sz="2000" b="1" dirty="0">
                 <a:latin typeface="Gill Sans MT" panose="020B0502020104020203" pitchFamily="34" charset="0"/>
               </a:rPr>
-              <a:t> API</a:t>
+              <a:t>Tweepy API</a:t>
             </a:r>
           </a:p>
           <a:p>
@@ -5888,52 +5962,10 @@
               <a:buNone/>
             </a:pPr>
             <a:r>
-              <a:rPr lang="en-US" sz="1600" dirty="0" err="1">
-                <a:latin typeface="Gill Sans MT" panose="020B0502020104020203" pitchFamily="34" charset="0"/>
-              </a:rPr>
-              <a:t>Tweepy</a:t>
-            </a:r>
-            <a:r>
               <a:rPr lang="en-US" sz="1600" dirty="0">
                 <a:latin typeface="Gill Sans MT" panose="020B0502020104020203" pitchFamily="34" charset="0"/>
               </a:rPr>
-              <a:t> is a Python library for accessing the Twitter API. It simplifies the process of interacting with Twitter's platform, allowing users to programmatically retrieve, post, and manipulate Twitter data. In our project, we utilize </a:t>
-            </a:r>
-            <a:r>
-              <a:rPr lang="en-US" sz="1600" dirty="0" err="1">
-                <a:latin typeface="Gill Sans MT" panose="020B0502020104020203" pitchFamily="34" charset="0"/>
-              </a:rPr>
-              <a:t>Tweepy</a:t>
-            </a:r>
-            <a:r>
-              <a:rPr lang="en-US" sz="1600" dirty="0">
-                <a:latin typeface="Gill Sans MT" panose="020B0502020104020203" pitchFamily="34" charset="0"/>
-              </a:rPr>
-              <a:t> to collect social media data directly from Twitter. This includes fetching tweets, user profiles, and associated metadata relevant to our sentiment analysis task. By leveraging </a:t>
-            </a:r>
-            <a:r>
-              <a:rPr lang="en-US" sz="1600" dirty="0" err="1">
-                <a:latin typeface="Gill Sans MT" panose="020B0502020104020203" pitchFamily="34" charset="0"/>
-              </a:rPr>
-              <a:t>Tweepy's</a:t>
-            </a:r>
-            <a:r>
-              <a:rPr lang="en-US" sz="1600" dirty="0">
-                <a:latin typeface="Gill Sans MT" panose="020B0502020104020203" pitchFamily="34" charset="0"/>
-              </a:rPr>
-              <a:t> functionalities, we can efficiently gather real-time or historical data from Twitter, enabling us to analyze current trends, monitor public sentiment on specific topics, and conduct comprehensive sentiment analysis studies. </a:t>
-            </a:r>
-            <a:r>
-              <a:rPr lang="en-US" sz="1600" dirty="0" err="1">
-                <a:latin typeface="Gill Sans MT" panose="020B0502020104020203" pitchFamily="34" charset="0"/>
-              </a:rPr>
-              <a:t>Tweepy</a:t>
-            </a:r>
-            <a:r>
-              <a:rPr lang="en-US" sz="1600" dirty="0">
-                <a:latin typeface="Gill Sans MT" panose="020B0502020104020203" pitchFamily="34" charset="0"/>
-              </a:rPr>
-              <a:t> streamlines the data collection process, providing a seamless interface to access Twitter's vast repository of publicly available data, which serves as a valuable resource for our sentiment analysis project.</a:t>
+              <a:t>Tweepy is a Python library for accessing the Twitter API. It simplifies the process of interacting with Twitter's platform, allowing users to programmatically retrieve, post, and manipulate Twitter data. In our project, we utilize Tweepy to collect social media data directly from Twitter. This includes fetching tweets, user profiles, and associated metadata relevant to our sentiment analysis task. By leveraging Tweepy's functionalities, we can efficiently gather real-time or historical data from Twitter, enabling us to analyze current trends, monitor public sentiment on specific topics, and conduct comprehensive sentiment analysis studies. Tweepy streamlines the data collection process, providing a seamless interface to access Twitter's vast repository of publicly available data, which serves as a valuable resource for our sentiment analysis project.</a:t>
             </a:r>
           </a:p>
         </p:txBody>
@@ -6263,25 +6295,7 @@
               <a:rPr lang="en-US" sz="1100" cap="none" dirty="0">
                 <a:latin typeface="Gill Sans MT" panose="020B0502020104020203" pitchFamily="34" charset="0"/>
               </a:rPr>
-              <a:t>3. Distribution Of ‘</a:t>
-            </a:r>
-            <a:r>
-              <a:rPr lang="en-US" sz="1100" cap="none" dirty="0" err="1">
-                <a:latin typeface="Gill Sans MT" panose="020B0502020104020203" pitchFamily="34" charset="0"/>
-              </a:rPr>
-              <a:t>Selected_text</a:t>
-            </a:r>
-            <a:r>
-              <a:rPr lang="en-US" sz="1100" cap="none" dirty="0">
-                <a:latin typeface="Gill Sans MT" panose="020B0502020104020203" pitchFamily="34" charset="0"/>
-              </a:rPr>
-              <a:t>’ Column Using </a:t>
-            </a:r>
-            <a:r>
-              <a:rPr lang="en-US" sz="1100" cap="none" dirty="0" err="1">
-                <a:latin typeface="Gill Sans MT" panose="020B0502020104020203" pitchFamily="34" charset="0"/>
-              </a:rPr>
-              <a:t>Plotly</a:t>
+              <a:t>3. Distribution Of ‘Selected_text’ Column Using Plotly</a:t>
             </a:r>
             <a:endParaRPr lang="en-US" b="1" dirty="0">
               <a:latin typeface="Gill Sans MT" panose="020B0502020104020203" pitchFamily="34" charset="0"/>
@@ -6431,31 +6445,7 @@
               <a:rPr lang="en-US" sz="1000" cap="none" dirty="0">
                 <a:latin typeface="Gill Sans MT" panose="020B0502020104020203" pitchFamily="34" charset="0"/>
               </a:rPr>
-              <a:t>4. A </a:t>
-            </a:r>
-            <a:r>
-              <a:rPr lang="en-US" sz="1000" cap="none" dirty="0" err="1">
-                <a:latin typeface="Gill Sans MT" panose="020B0502020104020203" pitchFamily="34" charset="0"/>
-              </a:rPr>
-              <a:t>Treemap</a:t>
-            </a:r>
-            <a:r>
-              <a:rPr lang="en-US" sz="1000" cap="none" dirty="0">
-                <a:latin typeface="Gill Sans MT" panose="020B0502020104020203" pitchFamily="34" charset="0"/>
-              </a:rPr>
-              <a:t> Of Common Words Is Made Using Express Module Of </a:t>
-            </a:r>
-            <a:r>
-              <a:rPr lang="en-US" sz="1000" cap="none" dirty="0" err="1">
-                <a:latin typeface="Gill Sans MT" panose="020B0502020104020203" pitchFamily="34" charset="0"/>
-              </a:rPr>
-              <a:t>Plotly</a:t>
-            </a:r>
-            <a:r>
-              <a:rPr lang="en-US" sz="1000" cap="none" dirty="0">
-                <a:latin typeface="Gill Sans MT" panose="020B0502020104020203" pitchFamily="34" charset="0"/>
-              </a:rPr>
-              <a:t> Library.</a:t>
+              <a:t>4. A Treemap Of Common Words Is Made Using Express Module Of Plotly Library.</a:t>
             </a:r>
             <a:endParaRPr lang="en-US" b="1" dirty="0">
               <a:latin typeface="Gill Sans MT" panose="020B0502020104020203" pitchFamily="34" charset="0"/>
@@ -6680,17 +6670,8 @@
               <a:rPr lang="en-US" sz="1000" dirty="0">
                 <a:latin typeface="Gill Sans MT" panose="020B0502020104020203" pitchFamily="34" charset="0"/>
               </a:rPr>
-              <a:t>5. Bar representation of common positive words using express module of </a:t>
-            </a:r>
-            <a:r>
-              <a:rPr lang="en-US" sz="1000" dirty="0" err="1">
-                <a:latin typeface="Gill Sans MT" panose="020B0502020104020203" pitchFamily="34" charset="0"/>
-              </a:rPr>
-              <a:t>plotly</a:t>
-            </a:r>
-            <a:endParaRPr lang="en-US" sz="1000" dirty="0">
-              <a:latin typeface="Gill Sans MT" panose="020B0502020104020203" pitchFamily="34" charset="0"/>
-            </a:endParaRPr>
+              <a:t>5. Bar representation of common positive words using express module of plotly</a:t>
+            </a:r>
           </a:p>
         </p:txBody>
       </p:sp>
@@ -6822,31 +6803,7 @@
               <a:rPr lang="en-US" sz="1000" cap="none" dirty="0">
                 <a:latin typeface="Gill Sans MT" panose="020B0502020104020203" pitchFamily="34" charset="0"/>
               </a:rPr>
-              <a:t>6. A </a:t>
-            </a:r>
-            <a:r>
-              <a:rPr lang="en-US" sz="1000" cap="none" dirty="0" err="1">
-                <a:latin typeface="Gill Sans MT" panose="020B0502020104020203" pitchFamily="34" charset="0"/>
-              </a:rPr>
-              <a:t>Treemap</a:t>
-            </a:r>
-            <a:r>
-              <a:rPr lang="en-US" sz="1000" cap="none" dirty="0">
-                <a:latin typeface="Gill Sans MT" panose="020B0502020104020203" pitchFamily="34" charset="0"/>
-              </a:rPr>
-              <a:t> Of Most Common Positive Words Is Made Using Express Module Of </a:t>
-            </a:r>
-            <a:r>
-              <a:rPr lang="en-US" sz="1000" cap="none" dirty="0" err="1">
-                <a:latin typeface="Gill Sans MT" panose="020B0502020104020203" pitchFamily="34" charset="0"/>
-              </a:rPr>
-              <a:t>Plotly</a:t>
-            </a:r>
-            <a:r>
-              <a:rPr lang="en-US" sz="1000" cap="none" dirty="0">
-                <a:latin typeface="Gill Sans MT" panose="020B0502020104020203" pitchFamily="34" charset="0"/>
-              </a:rPr>
-              <a:t> Library.</a:t>
+              <a:t>6. A Treemap Of Most Common Positive Words Is Made Using Express Module Of Plotly Library.</a:t>
             </a:r>
             <a:endParaRPr lang="en-US" b="1" dirty="0">
               <a:latin typeface="Gill Sans MT" panose="020B0502020104020203" pitchFamily="34" charset="0"/>
@@ -6993,31 +6950,7 @@
               <a:rPr lang="en-US" sz="1000" cap="none" dirty="0">
                 <a:latin typeface="Gill Sans MT" panose="020B0502020104020203" pitchFamily="34" charset="0"/>
               </a:rPr>
-              <a:t>7. A </a:t>
-            </a:r>
-            <a:r>
-              <a:rPr lang="en-US" sz="1000" cap="none" dirty="0" err="1">
-                <a:latin typeface="Gill Sans MT" panose="020B0502020104020203" pitchFamily="34" charset="0"/>
-              </a:rPr>
-              <a:t>Treemap</a:t>
-            </a:r>
-            <a:r>
-              <a:rPr lang="en-US" sz="1000" cap="none" dirty="0">
-                <a:latin typeface="Gill Sans MT" panose="020B0502020104020203" pitchFamily="34" charset="0"/>
-              </a:rPr>
-              <a:t> Of Most Common Neutral Words Is Made Using Express Module Of </a:t>
-            </a:r>
-            <a:r>
-              <a:rPr lang="en-US" sz="1000" cap="none" dirty="0" err="1">
-                <a:latin typeface="Gill Sans MT" panose="020B0502020104020203" pitchFamily="34" charset="0"/>
-              </a:rPr>
-              <a:t>Plotly</a:t>
-            </a:r>
-            <a:r>
-              <a:rPr lang="en-US" sz="1000" cap="none" dirty="0">
-                <a:latin typeface="Gill Sans MT" panose="020B0502020104020203" pitchFamily="34" charset="0"/>
-              </a:rPr>
-              <a:t> Library.</a:t>
+              <a:t>7. A Treemap Of Most Common Neutral Words Is Made Using Express Module Of Plotly Library.</a:t>
             </a:r>
             <a:endParaRPr lang="en-US" b="1" dirty="0">
               <a:latin typeface="Gill Sans MT" panose="020B0502020104020203" pitchFamily="34" charset="0"/>
@@ -7164,31 +7097,7 @@
               <a:rPr lang="en-US" sz="1000" cap="none" dirty="0">
                 <a:latin typeface="Gill Sans MT" panose="020B0502020104020203" pitchFamily="34" charset="0"/>
               </a:rPr>
-              <a:t>8. A </a:t>
-            </a:r>
-            <a:r>
-              <a:rPr lang="en-US" sz="1000" cap="none" dirty="0" err="1">
-                <a:latin typeface="Gill Sans MT" panose="020B0502020104020203" pitchFamily="34" charset="0"/>
-              </a:rPr>
-              <a:t>Treemap</a:t>
-            </a:r>
-            <a:r>
-              <a:rPr lang="en-US" sz="1000" cap="none" dirty="0">
-                <a:latin typeface="Gill Sans MT" panose="020B0502020104020203" pitchFamily="34" charset="0"/>
-              </a:rPr>
-              <a:t> Of Most Common Negative Words Is Made Using Express Module Of </a:t>
-            </a:r>
-            <a:r>
-              <a:rPr lang="en-US" sz="1000" cap="none" dirty="0" err="1">
-                <a:latin typeface="Gill Sans MT" panose="020B0502020104020203" pitchFamily="34" charset="0"/>
-              </a:rPr>
-              <a:t>Plotly</a:t>
-            </a:r>
-            <a:r>
-              <a:rPr lang="en-US" sz="1000" cap="none" dirty="0">
-                <a:latin typeface="Gill Sans MT" panose="020B0502020104020203" pitchFamily="34" charset="0"/>
-              </a:rPr>
-              <a:t> Library.</a:t>
+              <a:t>8. A Treemap Of Most Common Negative Words Is Made Using Express Module Of Plotly Library.</a:t>
             </a:r>
             <a:endParaRPr lang="en-US" b="1" dirty="0">
               <a:latin typeface="Gill Sans MT" panose="020B0502020104020203" pitchFamily="34" charset="0"/>
@@ -7877,8 +7786,8 @@
         </p:nvSpPr>
         <p:spPr>
           <a:xfrm>
-            <a:off x="814004" y="4727668"/>
-            <a:ext cx="7515991" cy="1345818"/>
+            <a:off x="814004" y="4770187"/>
+            <a:ext cx="7515991" cy="1378687"/>
           </a:xfrm>
         </p:spPr>
         <p:txBody>
@@ -7888,28 +7797,56 @@
           <a:lstStyle/>
           <a:p>
             <a:r>
-              <a:rPr lang="en-US" b="1" dirty="0">
+              <a:rPr lang="en-US" sz="3200" b="1" dirty="0">
                 <a:latin typeface="Gill Sans MT" panose="020B0502020104020203" pitchFamily="34" charset="0"/>
               </a:rPr>
               <a:t>Results:</a:t>
             </a:r>
             <a:br>
-              <a:rPr lang="en-US" b="1" dirty="0">
+              <a:rPr lang="en-US" sz="1000" b="1" cap="none" dirty="0">
                 <a:latin typeface="Gill Sans MT" panose="020B0502020104020203" pitchFamily="34" charset="0"/>
               </a:rPr>
             </a:br>
             <a:r>
-              <a:rPr lang="en-US" sz="1000" cap="none" dirty="0">
-                <a:latin typeface="Gill Sans MT" panose="020B0502020104020203" pitchFamily="34" charset="0"/>
-              </a:rPr>
-              <a:t>10. Final Result Of Roberta Model Using Twitter API</a:t>
-            </a:r>
-            <a:endParaRPr lang="en-US" b="1" dirty="0">
+              <a:rPr lang="en-US" sz="1000" b="1" cap="none" dirty="0">
+                <a:latin typeface="Gill Sans MT" panose="020B0502020104020203" pitchFamily="34" charset="0"/>
+              </a:rPr>
+              <a:t>10. Comparison Between Results Of Vader And Roberta</a:t>
+            </a:r>
+            <a:endParaRPr lang="en-US" sz="3200" b="1" dirty="0">
               <a:latin typeface="Gill Sans MT" panose="020B0502020104020203" pitchFamily="34" charset="0"/>
             </a:endParaRPr>
           </a:p>
         </p:txBody>
       </p:sp>
+      <p:pic>
+        <p:nvPicPr>
+          <p:cNvPr id="12" name="Picture Placeholder 11">
+            <a:extLst>
+              <a:ext uri="{FF2B5EF4-FFF2-40B4-BE49-F238E27FC236}">
+                <a16:creationId xmlns:a16="http://schemas.microsoft.com/office/drawing/2014/main" id="{78CB354C-3E8A-3EDA-0400-60EF3E428AD6}"/>
+              </a:ext>
+            </a:extLst>
+          </p:cNvPr>
+          <p:cNvPicPr>
+            <a:picLocks noGrp="1" noChangeAspect="1"/>
+          </p:cNvPicPr>
+          <p:nvPr>
+            <p:ph type="pic" idx="1"/>
+          </p:nvPr>
+        </p:nvPicPr>
+        <p:blipFill rotWithShape="1">
+          <a:blip r:embed="rId2"/>
+          <a:srcRect t="4017" b="1067"/>
+          <a:stretch/>
+        </p:blipFill>
+        <p:spPr>
+          <a:xfrm>
+            <a:off x="195943" y="149291"/>
+            <a:ext cx="8817428" cy="5113174"/>
+          </a:xfrm>
+        </p:spPr>
+      </p:pic>
       <p:sp>
         <p:nvSpPr>
           <p:cNvPr id="5" name="Slide Number Placeholder 4"/>
@@ -7946,6 +7883,122 @@
                 <a:buNone/>
               </a:pPr>
               <a:t>21</a:t>
+            </a:fld>
+            <a:endParaRPr lang="en-US" dirty="0"/>
+          </a:p>
+        </p:txBody>
+      </p:sp>
+    </p:spTree>
+    <p:extLst>
+      <p:ext uri="{BB962C8B-B14F-4D97-AF65-F5344CB8AC3E}">
+        <p14:creationId xmlns:p14="http://schemas.microsoft.com/office/powerpoint/2010/main" val="2377316459"/>
+      </p:ext>
+    </p:extLst>
+  </p:cSld>
+  <p:clrMapOvr>
+    <a:masterClrMapping/>
+  </p:clrMapOvr>
+</p:sld>
+</file>
+
+<file path=ppt/slides/slide22.xml><?xml version="1.0" encoding="utf-8"?>
+<p:sld xmlns:a="http://schemas.openxmlformats.org/drawingml/2006/main" xmlns:r="http://schemas.openxmlformats.org/officeDocument/2006/relationships" xmlns:p="http://schemas.openxmlformats.org/presentationml/2006/main">
+  <p:cSld>
+    <p:spTree>
+      <p:nvGrpSpPr>
+        <p:cNvPr id="1" name=""/>
+        <p:cNvGrpSpPr/>
+        <p:nvPr/>
+      </p:nvGrpSpPr>
+      <p:grpSpPr>
+        <a:xfrm>
+          <a:off x="0" y="0"/>
+          <a:ext cx="0" cy="0"/>
+          <a:chOff x="0" y="0"/>
+          <a:chExt cx="0" cy="0"/>
+        </a:xfrm>
+      </p:grpSpPr>
+      <p:sp>
+        <p:nvSpPr>
+          <p:cNvPr id="2" name="Title 1"/>
+          <p:cNvSpPr>
+            <a:spLocks noGrp="1"/>
+          </p:cNvSpPr>
+          <p:nvPr>
+            <p:ph type="title"/>
+          </p:nvPr>
+        </p:nvSpPr>
+        <p:spPr>
+          <a:xfrm>
+            <a:off x="814004" y="4727668"/>
+            <a:ext cx="7515991" cy="1345818"/>
+          </a:xfrm>
+        </p:spPr>
+        <p:txBody>
+          <a:bodyPr>
+            <a:normAutofit/>
+          </a:bodyPr>
+          <a:lstStyle/>
+          <a:p>
+            <a:r>
+              <a:rPr lang="en-US" b="1" dirty="0">
+                <a:latin typeface="Gill Sans MT" panose="020B0502020104020203" pitchFamily="34" charset="0"/>
+              </a:rPr>
+              <a:t>Results:</a:t>
+            </a:r>
+            <a:br>
+              <a:rPr lang="en-US" b="1" dirty="0">
+                <a:latin typeface="Gill Sans MT" panose="020B0502020104020203" pitchFamily="34" charset="0"/>
+              </a:rPr>
+            </a:br>
+            <a:r>
+              <a:rPr lang="en-US" sz="1000" cap="none" dirty="0">
+                <a:latin typeface="Gill Sans MT" panose="020B0502020104020203" pitchFamily="34" charset="0"/>
+              </a:rPr>
+              <a:t>10. Final Result Of Roberta Model Using Twitter API</a:t>
+            </a:r>
+            <a:endParaRPr lang="en-US" b="1" dirty="0">
+              <a:latin typeface="Gill Sans MT" panose="020B0502020104020203" pitchFamily="34" charset="0"/>
+            </a:endParaRPr>
+          </a:p>
+        </p:txBody>
+      </p:sp>
+      <p:sp>
+        <p:nvSpPr>
+          <p:cNvPr id="5" name="Slide Number Placeholder 4"/>
+          <p:cNvSpPr>
+            <a:spLocks noGrp="1"/>
+          </p:cNvSpPr>
+          <p:nvPr>
+            <p:ph type="sldNum" sz="quarter" idx="12"/>
+          </p:nvPr>
+        </p:nvSpPr>
+        <p:spPr/>
+        <p:txBody>
+          <a:bodyPr/>
+          <a:lstStyle/>
+          <a:p>
+            <a:pPr marL="0" lvl="0" indent="0" rtl="0">
+              <a:spcBef>
+                <a:spcPts val="0"/>
+              </a:spcBef>
+              <a:spcAft>
+                <a:spcPts val="0"/>
+              </a:spcAft>
+              <a:buNone/>
+            </a:pPr>
+            <a:fld id="{00000000-1234-1234-1234-123412341234}" type="slidenum">
+              <a:rPr lang="en-US" smtClean="0"/>
+              <a:pPr marL="0" lvl="0" indent="0" rtl="0">
+                <a:spcBef>
+                  <a:spcPts val="0"/>
+                </a:spcBef>
+                <a:spcAft>
+                  <a:spcPts val="0"/>
+                </a:spcAft>
+                <a:buNone/>
+              </a:pPr>
+              <a:t>22</a:t>
             </a:fld>
             <a:endParaRPr lang="en-US" dirty="0"/>
           </a:p>
@@ -7997,256 +8050,6 @@
 </p:sld>
 </file>
 
-<file path=ppt/slides/slide22.xml><?xml version="1.0" encoding="utf-8"?>
-<p:sld xmlns:a="http://schemas.openxmlformats.org/drawingml/2006/main" xmlns:r="http://schemas.openxmlformats.org/officeDocument/2006/relationships" xmlns:p="http://schemas.openxmlformats.org/presentationml/2006/main">
-  <p:cSld>
-    <p:spTree>
-      <p:nvGrpSpPr>
-        <p:cNvPr id="1" name=""/>
-        <p:cNvGrpSpPr/>
-        <p:nvPr/>
-      </p:nvGrpSpPr>
-      <p:grpSpPr>
-        <a:xfrm>
-          <a:off x="0" y="0"/>
-          <a:ext cx="0" cy="0"/>
-          <a:chOff x="0" y="0"/>
-          <a:chExt cx="0" cy="0"/>
-        </a:xfrm>
-      </p:grpSpPr>
-      <p:sp>
-        <p:nvSpPr>
-          <p:cNvPr id="5" name="Slide Number Placeholder 4"/>
-          <p:cNvSpPr>
-            <a:spLocks noGrp="1"/>
-          </p:cNvSpPr>
-          <p:nvPr>
-            <p:ph type="sldNum" sz="quarter" idx="12"/>
-          </p:nvPr>
-        </p:nvSpPr>
-        <p:spPr/>
-        <p:txBody>
-          <a:bodyPr/>
-          <a:lstStyle/>
-          <a:p>
-            <a:pPr marL="0" lvl="0" indent="0" rtl="0">
-              <a:spcBef>
-                <a:spcPts val="0"/>
-              </a:spcBef>
-              <a:spcAft>
-                <a:spcPts val="0"/>
-              </a:spcAft>
-              <a:buNone/>
-            </a:pPr>
-            <a:fld id="{00000000-1234-1234-1234-123412341234}" type="slidenum">
-              <a:rPr lang="en-US" smtClean="0"/>
-              <a:pPr marL="0" lvl="0" indent="0" rtl="0">
-                <a:spcBef>
-                  <a:spcPts val="0"/>
-                </a:spcBef>
-                <a:spcAft>
-                  <a:spcPts val="0"/>
-                </a:spcAft>
-                <a:buNone/>
-              </a:pPr>
-              <a:t>22</a:t>
-            </a:fld>
-            <a:endParaRPr lang="en-US" dirty="0"/>
-          </a:p>
-        </p:txBody>
-      </p:sp>
-      <p:sp>
-        <p:nvSpPr>
-          <p:cNvPr id="2" name="Title 1"/>
-          <p:cNvSpPr>
-            <a:spLocks noGrp="1"/>
-          </p:cNvSpPr>
-          <p:nvPr>
-            <p:ph type="title" idx="4294967295"/>
-          </p:nvPr>
-        </p:nvSpPr>
-        <p:spPr>
-          <a:xfrm>
-            <a:off x="-1" y="0"/>
-            <a:ext cx="9143999" cy="838200"/>
-          </a:xfrm>
-        </p:spPr>
-        <p:txBody>
-          <a:bodyPr/>
-          <a:lstStyle/>
-          <a:p>
-            <a:pPr algn="l"/>
-            <a:r>
-              <a:rPr lang="en-US" b="1" dirty="0">
-                <a:latin typeface="Gill Sans MT" panose="020B0502020104020203" pitchFamily="34" charset="0"/>
-              </a:rPr>
-              <a:t>Applications</a:t>
-            </a:r>
-          </a:p>
-        </p:txBody>
-      </p:sp>
-      <p:sp>
-        <p:nvSpPr>
-          <p:cNvPr id="3" name="Text Placeholder 2"/>
-          <p:cNvSpPr>
-            <a:spLocks noGrp="1"/>
-          </p:cNvSpPr>
-          <p:nvPr>
-            <p:ph idx="4294967295"/>
-          </p:nvPr>
-        </p:nvSpPr>
-        <p:spPr>
-          <a:xfrm>
-            <a:off x="0" y="838200"/>
-            <a:ext cx="9144000" cy="5073650"/>
-          </a:xfrm>
-        </p:spPr>
-        <p:txBody>
-          <a:bodyPr>
-            <a:normAutofit fontScale="92500"/>
-          </a:bodyPr>
-          <a:lstStyle/>
-          <a:p>
-            <a:pPr marL="342900">
-              <a:lnSpc>
-                <a:spcPct val="150000"/>
-              </a:lnSpc>
-              <a:buFont typeface="Wingdings" panose="05000000000000000000" pitchFamily="2" charset="2"/>
-              <a:buChar char="§"/>
-            </a:pPr>
-            <a:r>
-              <a:rPr lang="en-US" sz="1600" b="1" u="sng" dirty="0">
-                <a:latin typeface="Gill Sans MT" panose="020B0502020104020203" pitchFamily="34" charset="0"/>
-              </a:rPr>
-              <a:t>Trend Analysis:</a:t>
-            </a:r>
-            <a:r>
-              <a:rPr lang="en-US" sz="1600" dirty="0">
-                <a:latin typeface="Gill Sans MT" panose="020B0502020104020203" pitchFamily="34" charset="0"/>
-              </a:rPr>
-              <a:t> Researchers and analysts can analyze social media sentiment to identify emerging trends, track shifts in public opinion, and gain insights into societal dynamics. </a:t>
-            </a:r>
-          </a:p>
-          <a:p>
-            <a:pPr marL="342900">
-              <a:lnSpc>
-                <a:spcPct val="150000"/>
-              </a:lnSpc>
-              <a:buFont typeface="Wingdings" panose="05000000000000000000" pitchFamily="2" charset="2"/>
-              <a:buChar char="§"/>
-            </a:pPr>
-            <a:r>
-              <a:rPr lang="en-US" sz="1600" b="1" u="sng" dirty="0">
-                <a:latin typeface="Gill Sans MT" panose="020B0502020104020203" pitchFamily="34" charset="0"/>
-              </a:rPr>
-              <a:t>Market Research:</a:t>
-            </a:r>
-            <a:r>
-              <a:rPr lang="en-US" sz="1600" dirty="0">
-                <a:latin typeface="Gill Sans MT" panose="020B0502020104020203" pitchFamily="34" charset="0"/>
-              </a:rPr>
-              <a:t> Market researchers can analyze social media sentiment to understand consumer preferences, track market trends, and inform product development strategies.</a:t>
-            </a:r>
-          </a:p>
-          <a:p>
-            <a:pPr marL="342900">
-              <a:lnSpc>
-                <a:spcPct val="150000"/>
-              </a:lnSpc>
-              <a:buFont typeface="Wingdings" panose="05000000000000000000" pitchFamily="2" charset="2"/>
-              <a:buChar char="§"/>
-            </a:pPr>
-            <a:r>
-              <a:rPr lang="en-US" sz="1600" b="1" u="sng" dirty="0">
-                <a:latin typeface="Gill Sans MT" panose="020B0502020104020203" pitchFamily="34" charset="0"/>
-              </a:rPr>
-              <a:t>Customer Feedback Analysis:</a:t>
-            </a:r>
-            <a:r>
-              <a:rPr lang="en-US" sz="1600" dirty="0">
-                <a:latin typeface="Gill Sans MT" panose="020B0502020104020203" pitchFamily="34" charset="0"/>
-              </a:rPr>
-              <a:t> Companies can use sentiment analysis to analyze customer feedback on social media platforms, enabling them to improve products/services and enhance customer satisfaction.</a:t>
-            </a:r>
-          </a:p>
-          <a:p>
-            <a:pPr marL="342900">
-              <a:lnSpc>
-                <a:spcPct val="150000"/>
-              </a:lnSpc>
-              <a:buFont typeface="Wingdings" panose="05000000000000000000" pitchFamily="2" charset="2"/>
-              <a:buChar char="§"/>
-            </a:pPr>
-            <a:r>
-              <a:rPr lang="en-US" sz="1600" b="1" u="sng" dirty="0">
-                <a:latin typeface="Gill Sans MT" panose="020B0502020104020203" pitchFamily="34" charset="0"/>
-              </a:rPr>
-              <a:t>Reputation Management:</a:t>
-            </a:r>
-            <a:r>
-              <a:rPr lang="en-US" sz="1600" dirty="0">
-                <a:latin typeface="Gill Sans MT" panose="020B0502020104020203" pitchFamily="34" charset="0"/>
-              </a:rPr>
-              <a:t> Organizations can monitor social media sentiment to manage their online reputation, respond to negative sentiment promptly, and maintain a positive brand image.</a:t>
-            </a:r>
-          </a:p>
-          <a:p>
-            <a:pPr marL="342900">
-              <a:lnSpc>
-                <a:spcPct val="150000"/>
-              </a:lnSpc>
-              <a:buFont typeface="Wingdings" panose="05000000000000000000" pitchFamily="2" charset="2"/>
-              <a:buChar char="§"/>
-            </a:pPr>
-            <a:r>
-              <a:rPr lang="en-US" sz="1600" b="1" u="sng" dirty="0">
-                <a:latin typeface="Gill Sans MT" panose="020B0502020104020203" pitchFamily="34" charset="0"/>
-              </a:rPr>
-              <a:t>Event Monitoring:</a:t>
-            </a:r>
-            <a:r>
-              <a:rPr lang="en-US" sz="1600" dirty="0">
-                <a:latin typeface="Gill Sans MT" panose="020B0502020104020203" pitchFamily="34" charset="0"/>
-              </a:rPr>
-              <a:t> Event organizers can analyze social media sentiment to measure audience engagement, gather feedback, and assess the success of events in real-time.</a:t>
-            </a:r>
-          </a:p>
-          <a:p>
-            <a:pPr marL="342900">
-              <a:lnSpc>
-                <a:spcPct val="150000"/>
-              </a:lnSpc>
-              <a:buFont typeface="Wingdings" panose="05000000000000000000" pitchFamily="2" charset="2"/>
-              <a:buChar char="§"/>
-            </a:pPr>
-            <a:r>
-              <a:rPr lang="en-US" sz="1600" b="1" u="sng" dirty="0">
-                <a:latin typeface="Gill Sans MT" panose="020B0502020104020203" pitchFamily="34" charset="0"/>
-              </a:rPr>
-              <a:t>Political Analysis:</a:t>
-            </a:r>
-            <a:r>
-              <a:rPr lang="en-US" sz="1600" dirty="0">
-                <a:latin typeface="Gill Sans MT" panose="020B0502020104020203" pitchFamily="34" charset="0"/>
-              </a:rPr>
-              <a:t> Political analysts and policymakers can use sentiment analysis to gauge public opinion on political issues, track sentiment towards political candidates, and inform campaign strategies.</a:t>
-            </a:r>
-          </a:p>
-        </p:txBody>
-      </p:sp>
-    </p:spTree>
-    <p:extLst>
-      <p:ext uri="{BB962C8B-B14F-4D97-AF65-F5344CB8AC3E}">
-        <p14:creationId xmlns:p14="http://schemas.microsoft.com/office/powerpoint/2010/main" val="4189281958"/>
-      </p:ext>
-    </p:extLst>
-  </p:cSld>
-  <p:clrMapOvr>
-    <a:masterClrMapping/>
-  </p:clrMapOvr>
-</p:sld>
-</file>
-
 <file path=ppt/slides/slide23.xml><?xml version="1.0" encoding="utf-8"?>
 <p:sld xmlns:a="http://schemas.openxmlformats.org/drawingml/2006/main" xmlns:r="http://schemas.openxmlformats.org/officeDocument/2006/relationships" xmlns:p="http://schemas.openxmlformats.org/presentationml/2006/main">
   <p:cSld>
@@ -8330,7 +8133,7 @@
               <a:rPr lang="en-US" b="1" dirty="0">
                 <a:latin typeface="Gill Sans MT" panose="020B0502020104020203" pitchFamily="34" charset="0"/>
               </a:rPr>
-              <a:t>Future Scope</a:t>
+              <a:t>Applications</a:t>
             </a:r>
           </a:p>
         </p:txBody>
@@ -8348,26 +8151,138 @@
         <p:spPr>
           <a:xfrm>
             <a:off x="0" y="838200"/>
-            <a:ext cx="9144000" cy="5432425"/>
+            <a:ext cx="9144000" cy="5073650"/>
           </a:xfrm>
         </p:spPr>
         <p:txBody>
           <a:bodyPr>
-            <a:normAutofit/>
+            <a:normAutofit fontScale="92500"/>
           </a:bodyPr>
           <a:lstStyle/>
           <a:p>
-            <a:pPr marL="0" indent="0" algn="just">
+            <a:pPr marL="342900">
               <a:lnSpc>
                 <a:spcPct val="150000"/>
               </a:lnSpc>
-              <a:buNone/>
-            </a:pPr>
-            <a:r>
-              <a:rPr lang="en-US" sz="1800" dirty="0">
-                <a:latin typeface="Gill Sans MT" panose="020B0502020104020203" pitchFamily="34" charset="0"/>
-              </a:rPr>
-              <a:t>The future scope of our social media sentiment analysis project is promising, with several avenues for further development and application. Firstly, advancements in natural language processing (NLP) and machine learning techniques offer opportunities to enhance the accuracy and efficiency of sentiment analysis algorithms, enabling a more nuanced understanding of textual data and context. Additionally, integrating multimodal data sources, such as images and videos, could provide richer insights into social media sentiment and user behavior. Furthermore, extending the scope of analysis beyond popular social media platforms to include emerging platforms and regional languages would enable a more comprehensive understanding of global sentiment trends. Collaborations with diverse stakeholders, including businesses, government agencies, and non-profit organizations, could lead to innovative applications in areas such as public health, crisis management, and social impact assessment. Overall, the future of our project lies in leveraging emerging technologies and interdisciplinary collaborations to address evolving challenges and opportunities in the realm of social media sentiment analysis.</a:t>
+              <a:buFont typeface="Wingdings" panose="05000000000000000000" pitchFamily="2" charset="2"/>
+              <a:buChar char="§"/>
+            </a:pPr>
+            <a:r>
+              <a:rPr lang="en-US" sz="1600" b="1" u="sng" dirty="0">
+                <a:latin typeface="Gill Sans MT" panose="020B0502020104020203" pitchFamily="34" charset="0"/>
+              </a:rPr>
+              <a:t>Trend Analysis:</a:t>
+            </a:r>
+            <a:r>
+              <a:rPr lang="en-US" sz="1600" dirty="0">
+                <a:latin typeface="Gill Sans MT" panose="020B0502020104020203" pitchFamily="34" charset="0"/>
+              </a:rPr>
+              <a:t> Researchers and analysts can analyze social media sentiment to identify emerging trends, track shifts in public opinion, and gain insights into societal dynamics. </a:t>
+            </a:r>
+          </a:p>
+          <a:p>
+            <a:pPr marL="342900">
+              <a:lnSpc>
+                <a:spcPct val="150000"/>
+              </a:lnSpc>
+              <a:buFont typeface="Wingdings" panose="05000000000000000000" pitchFamily="2" charset="2"/>
+              <a:buChar char="§"/>
+            </a:pPr>
+            <a:r>
+              <a:rPr lang="en-US" sz="1600" b="1" u="sng" dirty="0">
+                <a:latin typeface="Gill Sans MT" panose="020B0502020104020203" pitchFamily="34" charset="0"/>
+              </a:rPr>
+              <a:t>Market Research:</a:t>
+            </a:r>
+            <a:r>
+              <a:rPr lang="en-US" sz="1600" dirty="0">
+                <a:latin typeface="Gill Sans MT" panose="020B0502020104020203" pitchFamily="34" charset="0"/>
+              </a:rPr>
+              <a:t> Market researchers can analyze social media sentiment to understand consumer preferences, track market trends, and inform product development strategies.</a:t>
+            </a:r>
+          </a:p>
+          <a:p>
+            <a:pPr marL="342900">
+              <a:lnSpc>
+                <a:spcPct val="150000"/>
+              </a:lnSpc>
+              <a:buFont typeface="Wingdings" panose="05000000000000000000" pitchFamily="2" charset="2"/>
+              <a:buChar char="§"/>
+            </a:pPr>
+            <a:r>
+              <a:rPr lang="en-US" sz="1600" b="1" u="sng" dirty="0">
+                <a:latin typeface="Gill Sans MT" panose="020B0502020104020203" pitchFamily="34" charset="0"/>
+              </a:rPr>
+              <a:t>Customer Feedback Analysis:</a:t>
+            </a:r>
+            <a:r>
+              <a:rPr lang="en-US" sz="1600" dirty="0">
+                <a:latin typeface="Gill Sans MT" panose="020B0502020104020203" pitchFamily="34" charset="0"/>
+              </a:rPr>
+              <a:t> Companies can use sentiment analysis to analyze customer feedback on social media platforms, enabling them to improve products/services and enhance customer satisfaction.</a:t>
+            </a:r>
+          </a:p>
+          <a:p>
+            <a:pPr marL="342900">
+              <a:lnSpc>
+                <a:spcPct val="150000"/>
+              </a:lnSpc>
+              <a:buFont typeface="Wingdings" panose="05000000000000000000" pitchFamily="2" charset="2"/>
+              <a:buChar char="§"/>
+            </a:pPr>
+            <a:r>
+              <a:rPr lang="en-US" sz="1600" b="1" u="sng" dirty="0">
+                <a:latin typeface="Gill Sans MT" panose="020B0502020104020203" pitchFamily="34" charset="0"/>
+              </a:rPr>
+              <a:t>Reputation Management:</a:t>
+            </a:r>
+            <a:r>
+              <a:rPr lang="en-US" sz="1600" dirty="0">
+                <a:latin typeface="Gill Sans MT" panose="020B0502020104020203" pitchFamily="34" charset="0"/>
+              </a:rPr>
+              <a:t> Organizations can monitor social media sentiment to manage their online reputation, respond to negative sentiment promptly, and maintain a positive brand image.</a:t>
+            </a:r>
+          </a:p>
+          <a:p>
+            <a:pPr marL="342900">
+              <a:lnSpc>
+                <a:spcPct val="150000"/>
+              </a:lnSpc>
+              <a:buFont typeface="Wingdings" panose="05000000000000000000" pitchFamily="2" charset="2"/>
+              <a:buChar char="§"/>
+            </a:pPr>
+            <a:r>
+              <a:rPr lang="en-US" sz="1600" b="1" u="sng" dirty="0">
+                <a:latin typeface="Gill Sans MT" panose="020B0502020104020203" pitchFamily="34" charset="0"/>
+              </a:rPr>
+              <a:t>Event Monitoring:</a:t>
+            </a:r>
+            <a:r>
+              <a:rPr lang="en-US" sz="1600" dirty="0">
+                <a:latin typeface="Gill Sans MT" panose="020B0502020104020203" pitchFamily="34" charset="0"/>
+              </a:rPr>
+              <a:t> Event organizers can analyze social media sentiment to measure audience engagement, gather feedback, and assess the success of events in real-time.</a:t>
+            </a:r>
+          </a:p>
+          <a:p>
+            <a:pPr marL="342900">
+              <a:lnSpc>
+                <a:spcPct val="150000"/>
+              </a:lnSpc>
+              <a:buFont typeface="Wingdings" panose="05000000000000000000" pitchFamily="2" charset="2"/>
+              <a:buChar char="§"/>
+            </a:pPr>
+            <a:r>
+              <a:rPr lang="en-US" sz="1600" b="1" u="sng" dirty="0">
+                <a:latin typeface="Gill Sans MT" panose="020B0502020104020203" pitchFamily="34" charset="0"/>
+              </a:rPr>
+              <a:t>Political Analysis:</a:t>
+            </a:r>
+            <a:r>
+              <a:rPr lang="en-US" sz="1600" dirty="0">
+                <a:latin typeface="Gill Sans MT" panose="020B0502020104020203" pitchFamily="34" charset="0"/>
+              </a:rPr>
+              <a:t> Political analysts and policymakers can use sentiment analysis to gauge public opinion on political issues, track sentiment towards political candidates, and inform campaign strategies.</a:t>
             </a:r>
           </a:p>
         </p:txBody>
@@ -8375,7 +8290,7 @@
     </p:spTree>
     <p:extLst>
       <p:ext uri="{BB962C8B-B14F-4D97-AF65-F5344CB8AC3E}">
-        <p14:creationId xmlns:p14="http://schemas.microsoft.com/office/powerpoint/2010/main" val="277779617"/>
+        <p14:creationId xmlns:p14="http://schemas.microsoft.com/office/powerpoint/2010/main" val="4189281958"/>
       </p:ext>
     </p:extLst>
   </p:cSld>
@@ -8468,7 +8383,7 @@
               <a:rPr lang="en-US" b="1" dirty="0">
                 <a:latin typeface="Gill Sans MT" panose="020B0502020104020203" pitchFamily="34" charset="0"/>
               </a:rPr>
-              <a:t>Conclusion</a:t>
+              <a:t>Future Scope</a:t>
             </a:r>
           </a:p>
         </p:txBody>
@@ -8485,8 +8400,8 @@
         </p:nvSpPr>
         <p:spPr>
           <a:xfrm>
-            <a:off x="0" y="1384300"/>
-            <a:ext cx="9144000" cy="2257425"/>
+            <a:off x="0" y="838200"/>
+            <a:ext cx="9144000" cy="5432425"/>
           </a:xfrm>
         </p:spPr>
         <p:txBody>
@@ -8505,19 +8420,7 @@
               <a:rPr lang="en-US" sz="1800" dirty="0">
                 <a:latin typeface="Gill Sans MT" panose="020B0502020104020203" pitchFamily="34" charset="0"/>
               </a:rPr>
-              <a:t>We're using a powerful combination of Twitter’s API and the Roberta language model to analyze real-time Twitter sentiment. </a:t>
-            </a:r>
-            <a:r>
-              <a:rPr lang="en-US" sz="1800" dirty="0" err="1">
-                <a:latin typeface="Gill Sans MT" panose="020B0502020104020203" pitchFamily="34" charset="0"/>
-              </a:rPr>
-              <a:t>Tweepy</a:t>
-            </a:r>
-            <a:r>
-              <a:rPr lang="en-US" sz="1800" dirty="0">
-                <a:latin typeface="Gill Sans MT" panose="020B0502020104020203" pitchFamily="34" charset="0"/>
-              </a:rPr>
-              <a:t> acts like a bridge, fetching tweets from the live stream. Roberta, a sophisticated AI model, then examines these tweets and classifies them as positive, negative, or neutral. This ongoing analysis provides valuable insights into the overall mood of Twitter, giving us a real-time pulse of public opinion.</a:t>
+              <a:t>The future scope of our social media sentiment analysis project is promising, with several avenues for further development and application. Firstly, advancements in natural language processing (NLP) and machine learning techniques offer opportunities to enhance the accuracy and efficiency of sentiment analysis algorithms, enabling a more nuanced understanding of textual data and context. Additionally, integrating multimodal data sources, such as images and videos, could provide richer insights into social media sentiment and user behavior. Furthermore, extending the scope of analysis beyond popular social media platforms to include emerging platforms and regional languages would enable a more comprehensive understanding of global sentiment trends. Collaborations with diverse stakeholders, including businesses, government agencies, and non-profit organizations, could lead to innovative applications in areas such as public health, crisis management, and social impact assessment. Overall, the future of our project lies in leveraging emerging technologies and interdisciplinary collaborations to address evolving challenges and opportunities in the realm of social media sentiment analysis.</a:t>
             </a:r>
           </a:p>
         </p:txBody>
@@ -8525,7 +8428,7 @@
     </p:spTree>
     <p:extLst>
       <p:ext uri="{BB962C8B-B14F-4D97-AF65-F5344CB8AC3E}">
-        <p14:creationId xmlns:p14="http://schemas.microsoft.com/office/powerpoint/2010/main" val="262105424"/>
+        <p14:creationId xmlns:p14="http://schemas.microsoft.com/office/powerpoint/2010/main" val="277779617"/>
       </p:ext>
     </p:extLst>
   </p:cSld>
@@ -8554,13 +8457,7 @@
       </p:grpSpPr>
       <p:sp>
         <p:nvSpPr>
-          <p:cNvPr id="5" name="Slide Number Placeholder 4">
-            <a:extLst>
-              <a:ext uri="{FF2B5EF4-FFF2-40B4-BE49-F238E27FC236}">
-                <a16:creationId xmlns:a16="http://schemas.microsoft.com/office/drawing/2014/main" id="{1A9BF153-A47A-F27D-92EA-A748C1F57DAF}"/>
-              </a:ext>
-            </a:extLst>
-          </p:cNvPr>
+          <p:cNvPr id="5" name="Slide Number Placeholder 4"/>
           <p:cNvSpPr>
             <a:spLocks noGrp="1"/>
           </p:cNvSpPr>
@@ -8601,13 +8498,7 @@
       </p:sp>
       <p:sp>
         <p:nvSpPr>
-          <p:cNvPr id="2" name="Title 1">
-            <a:extLst>
-              <a:ext uri="{FF2B5EF4-FFF2-40B4-BE49-F238E27FC236}">
-                <a16:creationId xmlns:a16="http://schemas.microsoft.com/office/drawing/2014/main" id="{8F632C86-9225-EC1F-A85E-529A8AB6C8C8}"/>
-              </a:ext>
-            </a:extLst>
-          </p:cNvPr>
+          <p:cNvPr id="2" name="Title 1"/>
           <p:cNvSpPr>
             <a:spLocks noGrp="1"/>
           </p:cNvSpPr>
@@ -8617,33 +8508,27 @@
         </p:nvSpPr>
         <p:spPr>
           <a:xfrm>
-            <a:off x="0" y="915989"/>
-            <a:ext cx="9144000" cy="897226"/>
+            <a:off x="-1" y="0"/>
+            <a:ext cx="9143999" cy="838200"/>
           </a:xfrm>
         </p:spPr>
         <p:txBody>
           <a:bodyPr/>
           <a:lstStyle/>
           <a:p>
-            <a:pPr algn="r"/>
-            <a:r>
-              <a:rPr lang="en-IN" b="1" dirty="0">
-                <a:latin typeface="Gill Sans MT" panose="020B0502020104020203" pitchFamily="34" charset="0"/>
-              </a:rPr>
-              <a:t>Reference</a:t>
-            </a:r>
-          </a:p>
-        </p:txBody>
-      </p:sp>
-      <p:sp>
-        <p:nvSpPr>
-          <p:cNvPr id="3" name="Text Placeholder 2">
-            <a:extLst>
-              <a:ext uri="{FF2B5EF4-FFF2-40B4-BE49-F238E27FC236}">
-                <a16:creationId xmlns:a16="http://schemas.microsoft.com/office/drawing/2014/main" id="{616E510B-384A-087D-3383-E6C99F5584BA}"/>
-              </a:ext>
-            </a:extLst>
-          </p:cNvPr>
+            <a:pPr algn="l"/>
+            <a:r>
+              <a:rPr lang="en-US" b="1" dirty="0">
+                <a:latin typeface="Gill Sans MT" panose="020B0502020104020203" pitchFamily="34" charset="0"/>
+              </a:rPr>
+              <a:t>Conclusion</a:t>
+            </a:r>
+          </a:p>
+        </p:txBody>
+      </p:sp>
+      <p:sp>
+        <p:nvSpPr>
+          <p:cNvPr id="3" name="Text Placeholder 2"/>
           <p:cNvSpPr>
             <a:spLocks noGrp="1"/>
           </p:cNvSpPr>
@@ -8653,43 +8538,27 @@
         </p:nvSpPr>
         <p:spPr>
           <a:xfrm>
-            <a:off x="260350" y="1891146"/>
-            <a:ext cx="8883650" cy="4546168"/>
+            <a:off x="0" y="1384300"/>
+            <a:ext cx="9144000" cy="2257425"/>
           </a:xfrm>
         </p:spPr>
         <p:txBody>
-          <a:bodyPr/>
-          <a:lstStyle/>
-          <a:p>
-            <a:pPr>
+          <a:bodyPr>
+            <a:normAutofit/>
+          </a:bodyPr>
+          <a:lstStyle/>
+          <a:p>
+            <a:pPr marL="0" indent="0" algn="just">
               <a:lnSpc>
                 <a:spcPct val="150000"/>
               </a:lnSpc>
-              <a:buFont typeface="Wingdings" panose="05000000000000000000" pitchFamily="2" charset="2"/>
-              <a:buChar char="§"/>
-            </a:pPr>
-            <a:r>
-              <a:rPr lang="en-IN" sz="2000" dirty="0">
-                <a:latin typeface="Gill Sans MT" panose="020B0502020104020203" pitchFamily="34" charset="0"/>
-                <a:cs typeface="Times New Roman" panose="02020603050405020304" pitchFamily="18" charset="0"/>
-              </a:rPr>
-              <a:t>ChatGPT, chat.openai.com, Accesed on May 14,2024</a:t>
-            </a:r>
-          </a:p>
-          <a:p>
-            <a:pPr>
-              <a:lnSpc>
-                <a:spcPct val="150000"/>
-              </a:lnSpc>
-              <a:buFont typeface="Wingdings" panose="05000000000000000000" pitchFamily="2" charset="2"/>
-              <a:buChar char="§"/>
-            </a:pPr>
-            <a:r>
-              <a:rPr lang="en-IN" sz="2000" dirty="0">
-                <a:latin typeface="Gill Sans MT" panose="020B0502020104020203" pitchFamily="34" charset="0"/>
-                <a:cs typeface="Times New Roman" panose="02020603050405020304" pitchFamily="18" charset="0"/>
-              </a:rPr>
-              <a:t>Google, https://www.google.com, Accesed on February 25,2024</a:t>
+              <a:buNone/>
+            </a:pPr>
+            <a:r>
+              <a:rPr lang="en-US" sz="1800" dirty="0">
+                <a:latin typeface="Gill Sans MT" panose="020B0502020104020203" pitchFamily="34" charset="0"/>
+              </a:rPr>
+              <a:t>We're using a powerful combination of Twitter’s API and the Roberta language model to analyze real-time Twitter sentiment. Tweepy acts like a bridge, fetching tweets from the live stream. Roberta, a sophisticated AI model, then examines these tweets and classifies them as positive, negative, or neutral. This ongoing analysis provides valuable insights into the overall mood of Twitter, giving us a real-time pulse of public opinion.</a:t>
             </a:r>
           </a:p>
         </p:txBody>
@@ -8697,7 +8566,7 @@
     </p:spTree>
     <p:extLst>
       <p:ext uri="{BB962C8B-B14F-4D97-AF65-F5344CB8AC3E}">
-        <p14:creationId xmlns:p14="http://schemas.microsoft.com/office/powerpoint/2010/main" val="159505980"/>
+        <p14:creationId xmlns:p14="http://schemas.microsoft.com/office/powerpoint/2010/main" val="262105424"/>
       </p:ext>
     </p:extLst>
   </p:cSld>
@@ -8726,66 +8595,10 @@
       </p:grpSpPr>
       <p:sp>
         <p:nvSpPr>
-          <p:cNvPr id="3" name="Text Placeholder 2">
-            <a:extLst>
-              <a:ext uri="{FF2B5EF4-FFF2-40B4-BE49-F238E27FC236}">
-                <a16:creationId xmlns:a16="http://schemas.microsoft.com/office/drawing/2014/main" id="{922D1CDA-F8AE-5AD2-4E10-C34589941235}"/>
-              </a:ext>
-            </a:extLst>
-          </p:cNvPr>
-          <p:cNvSpPr>
-            <a:spLocks noGrp="1"/>
-          </p:cNvSpPr>
-          <p:nvPr>
-            <p:ph idx="1"/>
-          </p:nvPr>
-        </p:nvSpPr>
-        <p:spPr>
-          <a:xfrm>
-            <a:off x="145473" y="1844385"/>
-            <a:ext cx="8884227" cy="2415887"/>
-          </a:xfrm>
-        </p:spPr>
-        <p:txBody>
-          <a:bodyPr>
-            <a:normAutofit fontScale="55000" lnSpcReduction="20000"/>
-          </a:bodyPr>
-          <a:lstStyle/>
-          <a:p>
-            <a:pPr marL="114300" indent="0">
-              <a:buNone/>
-            </a:pPr>
-            <a:endParaRPr lang="en-US" dirty="0"/>
-          </a:p>
-          <a:p>
-            <a:pPr marL="114300" indent="0">
-              <a:buNone/>
-            </a:pPr>
-            <a:endParaRPr lang="en-US" dirty="0"/>
-          </a:p>
-          <a:p>
-            <a:pPr marL="114300" indent="0">
-              <a:buNone/>
-            </a:pPr>
-            <a:endParaRPr lang="en-US" dirty="0"/>
-          </a:p>
-          <a:p>
-            <a:pPr marL="114300" indent="0" algn="ctr">
-              <a:buNone/>
-            </a:pPr>
-            <a:r>
-              <a:rPr lang="en-US" sz="20900" dirty="0"/>
-              <a:t>Thank You!!</a:t>
-            </a:r>
-          </a:p>
-        </p:txBody>
-      </p:sp>
-      <p:sp>
-        <p:nvSpPr>
           <p:cNvPr id="5" name="Slide Number Placeholder 4">
             <a:extLst>
               <a:ext uri="{FF2B5EF4-FFF2-40B4-BE49-F238E27FC236}">
-                <a16:creationId xmlns:a16="http://schemas.microsoft.com/office/drawing/2014/main" id="{6DAB9B5D-DEA3-284C-EEB9-470D1EDB55F2}"/>
+                <a16:creationId xmlns:a16="http://schemas.microsoft.com/office/drawing/2014/main" id="{1A9BF153-A47A-F27D-92EA-A748C1F57DAF}"/>
               </a:ext>
             </a:extLst>
           </p:cNvPr>
@@ -8822,6 +8635,234 @@
                 <a:buNone/>
               </a:pPr>
               <a:t>26</a:t>
+            </a:fld>
+            <a:endParaRPr lang="en-US" dirty="0"/>
+          </a:p>
+        </p:txBody>
+      </p:sp>
+      <p:sp>
+        <p:nvSpPr>
+          <p:cNvPr id="2" name="Title 1">
+            <a:extLst>
+              <a:ext uri="{FF2B5EF4-FFF2-40B4-BE49-F238E27FC236}">
+                <a16:creationId xmlns:a16="http://schemas.microsoft.com/office/drawing/2014/main" id="{8F632C86-9225-EC1F-A85E-529A8AB6C8C8}"/>
+              </a:ext>
+            </a:extLst>
+          </p:cNvPr>
+          <p:cNvSpPr>
+            <a:spLocks noGrp="1"/>
+          </p:cNvSpPr>
+          <p:nvPr>
+            <p:ph type="title" idx="4294967295"/>
+          </p:nvPr>
+        </p:nvSpPr>
+        <p:spPr>
+          <a:xfrm>
+            <a:off x="0" y="915989"/>
+            <a:ext cx="9144000" cy="897226"/>
+          </a:xfrm>
+        </p:spPr>
+        <p:txBody>
+          <a:bodyPr/>
+          <a:lstStyle/>
+          <a:p>
+            <a:pPr algn="r"/>
+            <a:r>
+              <a:rPr lang="en-IN" b="1" dirty="0">
+                <a:latin typeface="Gill Sans MT" panose="020B0502020104020203" pitchFamily="34" charset="0"/>
+              </a:rPr>
+              <a:t>Reference</a:t>
+            </a:r>
+          </a:p>
+        </p:txBody>
+      </p:sp>
+      <p:sp>
+        <p:nvSpPr>
+          <p:cNvPr id="3" name="Text Placeholder 2">
+            <a:extLst>
+              <a:ext uri="{FF2B5EF4-FFF2-40B4-BE49-F238E27FC236}">
+                <a16:creationId xmlns:a16="http://schemas.microsoft.com/office/drawing/2014/main" id="{616E510B-384A-087D-3383-E6C99F5584BA}"/>
+              </a:ext>
+            </a:extLst>
+          </p:cNvPr>
+          <p:cNvSpPr>
+            <a:spLocks noGrp="1"/>
+          </p:cNvSpPr>
+          <p:nvPr>
+            <p:ph idx="4294967295"/>
+          </p:nvPr>
+        </p:nvSpPr>
+        <p:spPr>
+          <a:xfrm>
+            <a:off x="260350" y="1891146"/>
+            <a:ext cx="8883650" cy="4546168"/>
+          </a:xfrm>
+        </p:spPr>
+        <p:txBody>
+          <a:bodyPr/>
+          <a:lstStyle/>
+          <a:p>
+            <a:pPr>
+              <a:lnSpc>
+                <a:spcPct val="150000"/>
+              </a:lnSpc>
+              <a:buFont typeface="Wingdings" panose="05000000000000000000" pitchFamily="2" charset="2"/>
+              <a:buChar char="§"/>
+            </a:pPr>
+            <a:r>
+              <a:rPr lang="en-IN" sz="2000" dirty="0">
+                <a:latin typeface="Gill Sans MT" panose="020B0502020104020203" pitchFamily="34" charset="0"/>
+                <a:cs typeface="Times New Roman" panose="02020603050405020304" pitchFamily="18" charset="0"/>
+              </a:rPr>
+              <a:t>ChatGPT, chat.openai.com, Accesed on May 14,2024</a:t>
+            </a:r>
+          </a:p>
+          <a:p>
+            <a:pPr>
+              <a:lnSpc>
+                <a:spcPct val="150000"/>
+              </a:lnSpc>
+              <a:buFont typeface="Wingdings" panose="05000000000000000000" pitchFamily="2" charset="2"/>
+              <a:buChar char="§"/>
+            </a:pPr>
+            <a:r>
+              <a:rPr lang="en-IN" sz="2000" dirty="0">
+                <a:latin typeface="Gill Sans MT" panose="020B0502020104020203" pitchFamily="34" charset="0"/>
+                <a:cs typeface="Times New Roman" panose="02020603050405020304" pitchFamily="18" charset="0"/>
+              </a:rPr>
+              <a:t>Google, https://www.google.com, Accesed on February 25,2024</a:t>
+            </a:r>
+          </a:p>
+        </p:txBody>
+      </p:sp>
+    </p:spTree>
+    <p:extLst>
+      <p:ext uri="{BB962C8B-B14F-4D97-AF65-F5344CB8AC3E}">
+        <p14:creationId xmlns:p14="http://schemas.microsoft.com/office/powerpoint/2010/main" val="159505980"/>
+      </p:ext>
+    </p:extLst>
+  </p:cSld>
+  <p:clrMapOvr>
+    <a:masterClrMapping/>
+  </p:clrMapOvr>
+</p:sld>
+</file>
+
+<file path=ppt/slides/slide27.xml><?xml version="1.0" encoding="utf-8"?>
+<p:sld xmlns:a="http://schemas.openxmlformats.org/drawingml/2006/main" xmlns:r="http://schemas.openxmlformats.org/officeDocument/2006/relationships" xmlns:p="http://schemas.openxmlformats.org/presentationml/2006/main">
+  <p:cSld>
+    <p:spTree>
+      <p:nvGrpSpPr>
+        <p:cNvPr id="1" name=""/>
+        <p:cNvGrpSpPr/>
+        <p:nvPr/>
+      </p:nvGrpSpPr>
+      <p:grpSpPr>
+        <a:xfrm>
+          <a:off x="0" y="0"/>
+          <a:ext cx="0" cy="0"/>
+          <a:chOff x="0" y="0"/>
+          <a:chExt cx="0" cy="0"/>
+        </a:xfrm>
+      </p:grpSpPr>
+      <p:sp>
+        <p:nvSpPr>
+          <p:cNvPr id="3" name="Text Placeholder 2">
+            <a:extLst>
+              <a:ext uri="{FF2B5EF4-FFF2-40B4-BE49-F238E27FC236}">
+                <a16:creationId xmlns:a16="http://schemas.microsoft.com/office/drawing/2014/main" id="{922D1CDA-F8AE-5AD2-4E10-C34589941235}"/>
+              </a:ext>
+            </a:extLst>
+          </p:cNvPr>
+          <p:cNvSpPr>
+            <a:spLocks noGrp="1"/>
+          </p:cNvSpPr>
+          <p:nvPr>
+            <p:ph idx="1"/>
+          </p:nvPr>
+        </p:nvSpPr>
+        <p:spPr>
+          <a:xfrm>
+            <a:off x="145473" y="1844385"/>
+            <a:ext cx="8884227" cy="2415887"/>
+          </a:xfrm>
+        </p:spPr>
+        <p:txBody>
+          <a:bodyPr>
+            <a:normAutofit fontScale="55000" lnSpcReduction="20000"/>
+          </a:bodyPr>
+          <a:lstStyle/>
+          <a:p>
+            <a:pPr marL="114300" indent="0">
+              <a:buNone/>
+            </a:pPr>
+            <a:endParaRPr lang="en-US" dirty="0"/>
+          </a:p>
+          <a:p>
+            <a:pPr marL="114300" indent="0">
+              <a:buNone/>
+            </a:pPr>
+            <a:endParaRPr lang="en-US" dirty="0"/>
+          </a:p>
+          <a:p>
+            <a:pPr marL="114300" indent="0">
+              <a:buNone/>
+            </a:pPr>
+            <a:endParaRPr lang="en-US" dirty="0"/>
+          </a:p>
+          <a:p>
+            <a:pPr marL="114300" indent="0" algn="ctr">
+              <a:buNone/>
+            </a:pPr>
+            <a:r>
+              <a:rPr lang="en-US" sz="20900" dirty="0"/>
+              <a:t>Thank You!!</a:t>
+            </a:r>
+          </a:p>
+        </p:txBody>
+      </p:sp>
+      <p:sp>
+        <p:nvSpPr>
+          <p:cNvPr id="5" name="Slide Number Placeholder 4">
+            <a:extLst>
+              <a:ext uri="{FF2B5EF4-FFF2-40B4-BE49-F238E27FC236}">
+                <a16:creationId xmlns:a16="http://schemas.microsoft.com/office/drawing/2014/main" id="{6DAB9B5D-DEA3-284C-EEB9-470D1EDB55F2}"/>
+              </a:ext>
+            </a:extLst>
+          </p:cNvPr>
+          <p:cNvSpPr>
+            <a:spLocks noGrp="1"/>
+          </p:cNvSpPr>
+          <p:nvPr>
+            <p:ph type="sldNum" sz="quarter" idx="12"/>
+          </p:nvPr>
+        </p:nvSpPr>
+        <p:spPr/>
+        <p:txBody>
+          <a:bodyPr/>
+          <a:lstStyle/>
+          <a:p>
+            <a:pPr marL="0" lvl="0" indent="0" rtl="0">
+              <a:spcBef>
+                <a:spcPts val="0"/>
+              </a:spcBef>
+              <a:spcAft>
+                <a:spcPts val="0"/>
+              </a:spcAft>
+              <a:buNone/>
+            </a:pPr>
+            <a:fld id="{00000000-1234-1234-1234-123412341234}" type="slidenum">
+              <a:rPr lang="en-US" smtClean="0"/>
+              <a:pPr marL="0" lvl="0" indent="0" rtl="0">
+                <a:spcBef>
+                  <a:spcPts val="0"/>
+                </a:spcBef>
+                <a:spcAft>
+                  <a:spcPts val="0"/>
+                </a:spcAft>
+                <a:buNone/>
+              </a:pPr>
+              <a:t>27</a:t>
             </a:fld>
             <a:endParaRPr lang="en-US" dirty="0"/>
           </a:p>
@@ -9746,14 +9787,11 @@
               <a:t> </a:t>
             </a:r>
             <a:r>
-              <a:rPr lang="en-US" b="1" dirty="0" err="1">
+              <a:rPr lang="en-US" b="1" dirty="0">
                 <a:latin typeface="Gill Sans MT" panose="020B0502020104020203" pitchFamily="34" charset="0"/>
               </a:rPr>
               <a:t>RoBERTa</a:t>
             </a:r>
-            <a:endParaRPr lang="en-US" b="1" dirty="0">
-              <a:latin typeface="Gill Sans MT" panose="020B0502020104020203" pitchFamily="34" charset="0"/>
-            </a:endParaRPr>
           </a:p>
         </p:txBody>
       </p:sp>
@@ -10024,19 +10062,7 @@
               <a:rPr lang="en-US" sz="1600" dirty="0">
                 <a:latin typeface="Gill Sans MT" panose="020B0502020104020203" pitchFamily="34" charset="0"/>
               </a:rPr>
-              <a:t>Pandas serve as a foundational tool for managing and analyzing social media data. We utilize Pandas </a:t>
-            </a:r>
-            <a:r>
-              <a:rPr lang="en-US" sz="1600" dirty="0" err="1">
-                <a:latin typeface="Gill Sans MT" panose="020B0502020104020203" pitchFamily="34" charset="0"/>
-              </a:rPr>
-              <a:t>DataFrames</a:t>
-            </a:r>
-            <a:r>
-              <a:rPr lang="en-US" sz="1600" dirty="0">
-                <a:latin typeface="Gill Sans MT" panose="020B0502020104020203" pitchFamily="34" charset="0"/>
-              </a:rPr>
-              <a:t> to organize and clean the data, apply transformations, and compute summary statistics. Its intuitive interface and powerful functionalities enable efficient data preprocessing, facilitating subsequent sentiment analysis tasks. Pandas flexibility allows us to seamlessly integrate various data sources and perform insightful analyses, contributing to the project's success.</a:t>
+              <a:t>Pandas serve as a foundational tool for managing and analyzing social media data. We utilize Pandas DataFrames to organize and clean the data, apply transformations, and compute summary statistics. Its intuitive interface and powerful functionalities enable efficient data preprocessing, facilitating subsequent sentiment analysis tasks. Pandas flexibility allows us to seamlessly integrate various data sources and perform insightful analyses, contributing to the project's success.</a:t>
             </a:r>
           </a:p>
           <a:p>
@@ -10047,7 +10073,7 @@
               <a:buNone/>
             </a:pPr>
             <a:r>
-              <a:rPr lang="en-US" sz="2000" b="1" dirty="0" err="1">
+              <a:rPr lang="en-US" sz="2000" b="1" dirty="0">
                 <a:latin typeface="Gill Sans MT" panose="020B0502020104020203" pitchFamily="34" charset="0"/>
               </a:rPr>
               <a:t>Numpy</a:t>

</xml_diff>